<commit_message>
Update lectrues of spring 2024
</commit_message>
<xml_diff>
--- a/lectures/Lec13_penetration_testing.pptx
+++ b/lectures/Lec13_penetration_testing.pptx
@@ -5,16 +5,28 @@
     <p:sldMasterId id="2147483648" r:id="rId1"/>
   </p:sldMasterIdLst>
   <p:notesMasterIdLst>
-    <p:notesMasterId r:id="rId6"/>
+    <p:notesMasterId r:id="rId18"/>
   </p:notesMasterIdLst>
   <p:handoutMasterIdLst>
-    <p:handoutMasterId r:id="rId7"/>
+    <p:handoutMasterId r:id="rId19"/>
   </p:handoutMasterIdLst>
   <p:sldIdLst>
     <p:sldId id="443" r:id="rId2"/>
-    <p:sldId id="453" r:id="rId3"/>
-    <p:sldId id="294" r:id="rId4"/>
-    <p:sldId id="454" r:id="rId5"/>
+    <p:sldId id="273" r:id="rId3"/>
+    <p:sldId id="274" r:id="rId4"/>
+    <p:sldId id="258" r:id="rId5"/>
+    <p:sldId id="259" r:id="rId6"/>
+    <p:sldId id="260" r:id="rId7"/>
+    <p:sldId id="261" r:id="rId8"/>
+    <p:sldId id="262" r:id="rId9"/>
+    <p:sldId id="263" r:id="rId10"/>
+    <p:sldId id="264" r:id="rId11"/>
+    <p:sldId id="265" r:id="rId12"/>
+    <p:sldId id="275" r:id="rId13"/>
+    <p:sldId id="276" r:id="rId14"/>
+    <p:sldId id="277" r:id="rId15"/>
+    <p:sldId id="278" r:id="rId16"/>
+    <p:sldId id="454" r:id="rId17"/>
   </p:sldIdLst>
   <p:sldSz cx="9144000" cy="6858000" type="screen4x3"/>
   <p:notesSz cx="7315200" cy="9601200"/>
@@ -5864,7 +5876,7 @@
               </a:rPr>
             </a:br>
             <a:r>
-              <a:rPr lang="en-US" altLang="en-US" sz="2400" b="0"/>
+              <a:rPr lang="en-US" altLang="en-US" sz="2400" b="0" dirty="0"/>
               <a:t>Lecture 13</a:t>
             </a:r>
             <a:br>
@@ -6439,6 +6451,853 @@
 </p:sld>
 </file>
 
+<file path=ppt/slides/slide10.xml><?xml version="1.0" encoding="utf-8"?>
+<p:sld xmlns:a="http://schemas.openxmlformats.org/drawingml/2006/main" xmlns:r="http://schemas.openxmlformats.org/officeDocument/2006/relationships" xmlns:p="http://schemas.openxmlformats.org/presentationml/2006/main">
+  <p:cSld>
+    <p:spTree>
+      <p:nvGrpSpPr>
+        <p:cNvPr id="1" name=""/>
+        <p:cNvGrpSpPr/>
+        <p:nvPr/>
+      </p:nvGrpSpPr>
+      <p:grpSpPr>
+        <a:xfrm>
+          <a:off x="0" y="0"/>
+          <a:ext cx="0" cy="0"/>
+          <a:chOff x="0" y="0"/>
+          <a:chExt cx="0" cy="0"/>
+        </a:xfrm>
+      </p:grpSpPr>
+      <p:sp>
+        <p:nvSpPr>
+          <p:cNvPr id="2" name="Title 1"/>
+          <p:cNvSpPr>
+            <a:spLocks noGrp="1"/>
+          </p:cNvSpPr>
+          <p:nvPr>
+            <p:ph type="title"/>
+          </p:nvPr>
+        </p:nvSpPr>
+        <p:spPr/>
+        <p:txBody>
+          <a:bodyPr/>
+          <a:lstStyle/>
+          <a:p>
+            <a:r>
+              <a:rPr lang="en-US" dirty="0"/>
+              <a:t>Post Exploitation</a:t>
+            </a:r>
+          </a:p>
+        </p:txBody>
+      </p:sp>
+      <p:sp>
+        <p:nvSpPr>
+          <p:cNvPr id="3" name="Content Placeholder 2"/>
+          <p:cNvSpPr>
+            <a:spLocks noGrp="1"/>
+          </p:cNvSpPr>
+          <p:nvPr>
+            <p:ph idx="1"/>
+          </p:nvPr>
+        </p:nvSpPr>
+        <p:spPr/>
+        <p:txBody>
+          <a:bodyPr/>
+          <a:lstStyle/>
+          <a:p>
+            <a:r>
+              <a:rPr lang="en-US" dirty="0"/>
+              <a:t>After you have compromised one or more systems (there are many more to come)</a:t>
+            </a:r>
+          </a:p>
+          <a:p>
+            <a:r>
+              <a:rPr lang="en-US" dirty="0"/>
+              <a:t>-Targets specific systems</a:t>
+            </a:r>
+          </a:p>
+          <a:p>
+            <a:r>
+              <a:rPr lang="en-US" dirty="0"/>
+              <a:t>-Identifies critical infrastructure</a:t>
+            </a:r>
+          </a:p>
+          <a:p>
+            <a:r>
+              <a:rPr lang="en-US" dirty="0"/>
+              <a:t>-Targets information or data of value to the company</a:t>
+            </a:r>
+          </a:p>
+          <a:p>
+            <a:endParaRPr lang="en-US" dirty="0"/>
+          </a:p>
+          <a:p>
+            <a:r>
+              <a:rPr lang="en-US" dirty="0"/>
+              <a:t>Start with systems that will present the most business impact to the company if breached</a:t>
+            </a:r>
+          </a:p>
+        </p:txBody>
+      </p:sp>
+    </p:spTree>
+    <p:extLst>
+      <p:ext uri="{BB962C8B-B14F-4D97-AF65-F5344CB8AC3E}">
+        <p14:creationId xmlns:p14="http://schemas.microsoft.com/office/powerpoint/2010/main" val="901405522"/>
+      </p:ext>
+    </p:extLst>
+  </p:cSld>
+  <p:clrMapOvr>
+    <a:masterClrMapping/>
+  </p:clrMapOvr>
+  <p:transition spd="med"/>
+</p:sld>
+</file>
+
+<file path=ppt/slides/slide11.xml><?xml version="1.0" encoding="utf-8"?>
+<p:sld xmlns:a="http://schemas.openxmlformats.org/drawingml/2006/main" xmlns:r="http://schemas.openxmlformats.org/officeDocument/2006/relationships" xmlns:p="http://schemas.openxmlformats.org/presentationml/2006/main">
+  <p:cSld>
+    <p:spTree>
+      <p:nvGrpSpPr>
+        <p:cNvPr id="1" name=""/>
+        <p:cNvGrpSpPr/>
+        <p:nvPr/>
+      </p:nvGrpSpPr>
+      <p:grpSpPr>
+        <a:xfrm>
+          <a:off x="0" y="0"/>
+          <a:ext cx="0" cy="0"/>
+          <a:chOff x="0" y="0"/>
+          <a:chExt cx="0" cy="0"/>
+        </a:xfrm>
+      </p:grpSpPr>
+      <p:sp>
+        <p:nvSpPr>
+          <p:cNvPr id="2" name="Title 1"/>
+          <p:cNvSpPr>
+            <a:spLocks noGrp="1"/>
+          </p:cNvSpPr>
+          <p:nvPr>
+            <p:ph type="title"/>
+          </p:nvPr>
+        </p:nvSpPr>
+        <p:spPr/>
+        <p:txBody>
+          <a:bodyPr/>
+          <a:lstStyle/>
+          <a:p>
+            <a:r>
+              <a:rPr lang="en-US" dirty="0"/>
+              <a:t>Post Exploitation</a:t>
+            </a:r>
+          </a:p>
+        </p:txBody>
+      </p:sp>
+      <p:sp>
+        <p:nvSpPr>
+          <p:cNvPr id="3" name="Content Placeholder 2"/>
+          <p:cNvSpPr>
+            <a:spLocks noGrp="1"/>
+          </p:cNvSpPr>
+          <p:nvPr>
+            <p:ph idx="1"/>
+          </p:nvPr>
+        </p:nvSpPr>
+        <p:spPr/>
+        <p:txBody>
+          <a:bodyPr/>
+          <a:lstStyle/>
+          <a:p>
+            <a:r>
+              <a:rPr lang="en-US" dirty="0"/>
+              <a:t>Take the time to determine what systems do and their different user roles</a:t>
+            </a:r>
+          </a:p>
+          <a:p>
+            <a:r>
+              <a:rPr lang="en-US" dirty="0"/>
+              <a:t>Ex: suppose you compromise a domain?  Big deal.  </a:t>
+            </a:r>
+          </a:p>
+          <a:p>
+            <a:r>
+              <a:rPr lang="en-US" dirty="0"/>
+              <a:t>What else could you do in terms of the systems that the business uses?  Backdoor code on a financial application? What about their payroll system?  Intellectual property? </a:t>
+            </a:r>
+          </a:p>
+        </p:txBody>
+      </p:sp>
+    </p:spTree>
+    <p:extLst>
+      <p:ext uri="{BB962C8B-B14F-4D97-AF65-F5344CB8AC3E}">
+        <p14:creationId xmlns:p14="http://schemas.microsoft.com/office/powerpoint/2010/main" val="384047907"/>
+      </p:ext>
+    </p:extLst>
+  </p:cSld>
+  <p:clrMapOvr>
+    <a:masterClrMapping/>
+  </p:clrMapOvr>
+  <p:transition spd="med"/>
+</p:sld>
+</file>
+
+<file path=ppt/slides/slide12.xml><?xml version="1.0" encoding="utf-8"?>
+<p:sld xmlns:a="http://schemas.openxmlformats.org/drawingml/2006/main" xmlns:r="http://schemas.openxmlformats.org/officeDocument/2006/relationships" xmlns:p="http://schemas.openxmlformats.org/presentationml/2006/main">
+  <p:cSld>
+    <p:spTree>
+      <p:nvGrpSpPr>
+        <p:cNvPr id="1" name=""/>
+        <p:cNvGrpSpPr/>
+        <p:nvPr/>
+      </p:nvGrpSpPr>
+      <p:grpSpPr>
+        <a:xfrm>
+          <a:off x="0" y="0"/>
+          <a:ext cx="0" cy="0"/>
+          <a:chOff x="0" y="0"/>
+          <a:chExt cx="0" cy="0"/>
+        </a:xfrm>
+      </p:grpSpPr>
+      <p:sp>
+        <p:nvSpPr>
+          <p:cNvPr id="2" name="Title 1"/>
+          <p:cNvSpPr>
+            <a:spLocks noGrp="1"/>
+          </p:cNvSpPr>
+          <p:nvPr>
+            <p:ph type="title"/>
+          </p:nvPr>
+        </p:nvSpPr>
+        <p:spPr/>
+        <p:txBody>
+          <a:bodyPr/>
+          <a:lstStyle/>
+          <a:p>
+            <a:r>
+              <a:rPr lang="en-US" dirty="0"/>
+              <a:t>Reporting 	</a:t>
+            </a:r>
+          </a:p>
+        </p:txBody>
+      </p:sp>
+      <p:sp>
+        <p:nvSpPr>
+          <p:cNvPr id="3" name="Content Placeholder 2"/>
+          <p:cNvSpPr>
+            <a:spLocks noGrp="1"/>
+          </p:cNvSpPr>
+          <p:nvPr>
+            <p:ph idx="1"/>
+          </p:nvPr>
+        </p:nvSpPr>
+        <p:spPr/>
+        <p:txBody>
+          <a:bodyPr/>
+          <a:lstStyle/>
+          <a:p>
+            <a:r>
+              <a:rPr lang="en-US" dirty="0"/>
+              <a:t>Most important element of the penetration test</a:t>
+            </a:r>
+          </a:p>
+          <a:p>
+            <a:r>
+              <a:rPr lang="en-US" dirty="0"/>
+              <a:t>Include at least: </a:t>
+            </a:r>
+          </a:p>
+          <a:p>
+            <a:pPr>
+              <a:buFont typeface="Wingdings" panose="05000000000000000000" pitchFamily="2" charset="2"/>
+              <a:buChar char="§"/>
+            </a:pPr>
+            <a:r>
+              <a:rPr lang="en-US" dirty="0"/>
+              <a:t>Executive Summary</a:t>
+            </a:r>
+          </a:p>
+          <a:p>
+            <a:pPr>
+              <a:buFont typeface="Wingdings" panose="05000000000000000000" pitchFamily="2" charset="2"/>
+              <a:buChar char="§"/>
+            </a:pPr>
+            <a:r>
+              <a:rPr lang="en-US" dirty="0"/>
+              <a:t>Executive Presentation</a:t>
+            </a:r>
+          </a:p>
+          <a:p>
+            <a:pPr>
+              <a:buFont typeface="Wingdings" panose="05000000000000000000" pitchFamily="2" charset="2"/>
+              <a:buChar char="§"/>
+            </a:pPr>
+            <a:r>
+              <a:rPr lang="en-US" dirty="0"/>
+              <a:t>Technical Findings</a:t>
+            </a:r>
+          </a:p>
+          <a:p>
+            <a:pPr lvl="2">
+              <a:buFont typeface="Arial" panose="020B0604020202020204" pitchFamily="34" charset="0"/>
+              <a:buChar char="•"/>
+            </a:pPr>
+            <a:r>
+              <a:rPr lang="en-US" dirty="0"/>
+              <a:t>Used by the client to remediate security holes</a:t>
+            </a:r>
+          </a:p>
+          <a:p>
+            <a:pPr lvl="2">
+              <a:buFont typeface="Arial" panose="020B0604020202020204" pitchFamily="34" charset="0"/>
+              <a:buChar char="•"/>
+            </a:pPr>
+            <a:r>
+              <a:rPr lang="en-US" dirty="0"/>
+              <a:t>Be sure to warn the client about the thinking that fixing the hole solves the whole problem.  Ex: </a:t>
+            </a:r>
+            <a:r>
+              <a:rPr lang="en-US" dirty="0" err="1"/>
+              <a:t>sql</a:t>
+            </a:r>
+            <a:r>
+              <a:rPr lang="en-US" dirty="0"/>
+              <a:t> injection vulnerability – they fix their problem, but have they addressed any 3</a:t>
+            </a:r>
+            <a:r>
+              <a:rPr lang="en-US" baseline="30000" dirty="0"/>
+              <a:t>rd</a:t>
+            </a:r>
+            <a:r>
+              <a:rPr lang="en-US" dirty="0"/>
+              <a:t> party applications that are connected?</a:t>
+            </a:r>
+          </a:p>
+        </p:txBody>
+      </p:sp>
+    </p:spTree>
+    <p:extLst>
+      <p:ext uri="{BB962C8B-B14F-4D97-AF65-F5344CB8AC3E}">
+        <p14:creationId xmlns:p14="http://schemas.microsoft.com/office/powerpoint/2010/main" val="487708264"/>
+      </p:ext>
+    </p:extLst>
+  </p:cSld>
+  <p:clrMapOvr>
+    <a:masterClrMapping/>
+  </p:clrMapOvr>
+  <p:transition spd="med"/>
+</p:sld>
+</file>
+
+<file path=ppt/slides/slide13.xml><?xml version="1.0" encoding="utf-8"?>
+<p:sld xmlns:a="http://schemas.openxmlformats.org/drawingml/2006/main" xmlns:r="http://schemas.openxmlformats.org/officeDocument/2006/relationships" xmlns:p="http://schemas.openxmlformats.org/presentationml/2006/main">
+  <p:cSld>
+    <p:spTree>
+      <p:nvGrpSpPr>
+        <p:cNvPr id="1" name=""/>
+        <p:cNvGrpSpPr/>
+        <p:nvPr/>
+      </p:nvGrpSpPr>
+      <p:grpSpPr>
+        <a:xfrm>
+          <a:off x="0" y="0"/>
+          <a:ext cx="0" cy="0"/>
+          <a:chOff x="0" y="0"/>
+          <a:chExt cx="0" cy="0"/>
+        </a:xfrm>
+      </p:grpSpPr>
+      <p:sp>
+        <p:nvSpPr>
+          <p:cNvPr id="2" name="Title 1"/>
+          <p:cNvSpPr>
+            <a:spLocks noGrp="1"/>
+          </p:cNvSpPr>
+          <p:nvPr>
+            <p:ph type="title"/>
+          </p:nvPr>
+        </p:nvSpPr>
+        <p:spPr/>
+        <p:txBody>
+          <a:bodyPr/>
+          <a:lstStyle/>
+          <a:p>
+            <a:r>
+              <a:rPr lang="en-US" dirty="0"/>
+              <a:t>Types of Penetration Tests</a:t>
+            </a:r>
+          </a:p>
+        </p:txBody>
+      </p:sp>
+      <p:sp>
+        <p:nvSpPr>
+          <p:cNvPr id="3" name="Content Placeholder 2"/>
+          <p:cNvSpPr>
+            <a:spLocks noGrp="1"/>
+          </p:cNvSpPr>
+          <p:nvPr>
+            <p:ph idx="1"/>
+          </p:nvPr>
+        </p:nvSpPr>
+        <p:spPr/>
+        <p:txBody>
+          <a:bodyPr>
+            <a:normAutofit/>
+          </a:bodyPr>
+          <a:lstStyle/>
+          <a:p>
+            <a:r>
+              <a:rPr lang="en-US" dirty="0"/>
+              <a:t>Overt Penetration Testing</a:t>
+            </a:r>
+          </a:p>
+          <a:p>
+            <a:pPr lvl="1"/>
+            <a:r>
+              <a:rPr lang="en-US" dirty="0"/>
+              <a:t>You work with the organization to identify the potential security threats</a:t>
+            </a:r>
+          </a:p>
+          <a:p>
+            <a:pPr lvl="2"/>
+            <a:r>
+              <a:rPr lang="en-US" dirty="0"/>
+              <a:t>Advantages: full access without blocks, detection doesn’t matter, access to insider knowledge</a:t>
+            </a:r>
+          </a:p>
+          <a:p>
+            <a:pPr lvl="2"/>
+            <a:r>
+              <a:rPr lang="en-US" dirty="0"/>
+              <a:t>Disadvantages: don’t get the opportunity to test incident response</a:t>
+            </a:r>
+          </a:p>
+          <a:p>
+            <a:r>
+              <a:rPr lang="en-US" dirty="0"/>
+              <a:t>Covert Penetration Testing</a:t>
+            </a:r>
+          </a:p>
+          <a:p>
+            <a:pPr lvl="1"/>
+            <a:r>
+              <a:rPr lang="en-US" dirty="0"/>
+              <a:t>Performed to test the internal security team’s ability to detect and respond to an attack</a:t>
+            </a:r>
+          </a:p>
+          <a:p>
+            <a:pPr lvl="2"/>
+            <a:r>
+              <a:rPr lang="en-US" dirty="0"/>
+              <a:t>Advantages: Test incident response, most closely simulates a true attack</a:t>
+            </a:r>
+          </a:p>
+          <a:p>
+            <a:pPr lvl="2"/>
+            <a:r>
+              <a:rPr lang="en-US" dirty="0"/>
+              <a:t>Disadvantages: Costly, time consuming, require more skill </a:t>
+            </a:r>
+          </a:p>
+          <a:p>
+            <a:pPr lvl="2"/>
+            <a:r>
+              <a:rPr lang="en-US" dirty="0"/>
+              <a:t>Note: because of cost of covert – most will target only one vulnerability, the one with easiest access – gaining access undetected is key</a:t>
+            </a:r>
+          </a:p>
+        </p:txBody>
+      </p:sp>
+    </p:spTree>
+    <p:extLst>
+      <p:ext uri="{BB962C8B-B14F-4D97-AF65-F5344CB8AC3E}">
+        <p14:creationId xmlns:p14="http://schemas.microsoft.com/office/powerpoint/2010/main" val="645669286"/>
+      </p:ext>
+    </p:extLst>
+  </p:cSld>
+  <p:clrMapOvr>
+    <a:masterClrMapping/>
+  </p:clrMapOvr>
+  <p:transition spd="med"/>
+</p:sld>
+</file>
+
+<file path=ppt/slides/slide14.xml><?xml version="1.0" encoding="utf-8"?>
+<p:sld xmlns:a="http://schemas.openxmlformats.org/drawingml/2006/main" xmlns:r="http://schemas.openxmlformats.org/officeDocument/2006/relationships" xmlns:p="http://schemas.openxmlformats.org/presentationml/2006/main">
+  <p:cSld>
+    <p:spTree>
+      <p:nvGrpSpPr>
+        <p:cNvPr id="1" name=""/>
+        <p:cNvGrpSpPr/>
+        <p:nvPr/>
+      </p:nvGrpSpPr>
+      <p:grpSpPr>
+        <a:xfrm>
+          <a:off x="0" y="0"/>
+          <a:ext cx="0" cy="0"/>
+          <a:chOff x="0" y="0"/>
+          <a:chExt cx="0" cy="0"/>
+        </a:xfrm>
+      </p:grpSpPr>
+      <p:sp>
+        <p:nvSpPr>
+          <p:cNvPr id="2" name="Title 1"/>
+          <p:cNvSpPr>
+            <a:spLocks noGrp="1"/>
+          </p:cNvSpPr>
+          <p:nvPr>
+            <p:ph type="title"/>
+          </p:nvPr>
+        </p:nvSpPr>
+        <p:spPr/>
+        <p:txBody>
+          <a:bodyPr/>
+          <a:lstStyle/>
+          <a:p>
+            <a:r>
+              <a:rPr lang="en-US" dirty="0"/>
+              <a:t>Vulnerability Scanners</a:t>
+            </a:r>
+          </a:p>
+        </p:txBody>
+      </p:sp>
+      <p:sp>
+        <p:nvSpPr>
+          <p:cNvPr id="3" name="Content Placeholder 2"/>
+          <p:cNvSpPr>
+            <a:spLocks noGrp="1"/>
+          </p:cNvSpPr>
+          <p:nvPr>
+            <p:ph idx="1"/>
+          </p:nvPr>
+        </p:nvSpPr>
+        <p:spPr/>
+        <p:txBody>
+          <a:bodyPr/>
+          <a:lstStyle/>
+          <a:p>
+            <a:r>
+              <a:rPr lang="en-US" dirty="0"/>
+              <a:t>Automated tools used to identify security flaws</a:t>
+            </a:r>
+          </a:p>
+          <a:p>
+            <a:pPr lvl="1"/>
+            <a:r>
+              <a:rPr lang="en-US" dirty="0"/>
+              <a:t>1. Fingerprint a target’s operating system</a:t>
+            </a:r>
+          </a:p>
+          <a:p>
+            <a:pPr lvl="1"/>
+            <a:r>
+              <a:rPr lang="en-US" dirty="0"/>
+              <a:t>2. Take one OS identified, use scanner to determine if vulnerabilities exist</a:t>
+            </a:r>
+          </a:p>
+          <a:p>
+            <a:pPr lvl="1"/>
+            <a:endParaRPr lang="en-US" dirty="0"/>
+          </a:p>
+          <a:p>
+            <a:pPr lvl="1"/>
+            <a:r>
+              <a:rPr lang="en-US" dirty="0"/>
+              <a:t>Although Vulnerability Scanners play an essential role in Penetration Testing, a penetration test CANNOT be completed automated!  Most penetration testers with years of experience rarely use vulnerability scanners – they rely more on their knowledge and experience – business knowledge is also a key factor.  </a:t>
+            </a:r>
+          </a:p>
+          <a:p>
+            <a:pPr lvl="1"/>
+            <a:endParaRPr lang="en-US" dirty="0"/>
+          </a:p>
+          <a:p>
+            <a:endParaRPr lang="en-US" dirty="0"/>
+          </a:p>
+        </p:txBody>
+      </p:sp>
+    </p:spTree>
+    <p:extLst>
+      <p:ext uri="{BB962C8B-B14F-4D97-AF65-F5344CB8AC3E}">
+        <p14:creationId xmlns:p14="http://schemas.microsoft.com/office/powerpoint/2010/main" val="3186413438"/>
+      </p:ext>
+    </p:extLst>
+  </p:cSld>
+  <p:clrMapOvr>
+    <a:masterClrMapping/>
+  </p:clrMapOvr>
+  <p:transition spd="med"/>
+</p:sld>
+</file>
+
+<file path=ppt/slides/slide15.xml><?xml version="1.0" encoding="utf-8"?>
+<p:sld xmlns:a="http://schemas.openxmlformats.org/drawingml/2006/main" xmlns:r="http://schemas.openxmlformats.org/officeDocument/2006/relationships" xmlns:p="http://schemas.openxmlformats.org/presentationml/2006/main">
+  <p:cSld>
+    <p:spTree>
+      <p:nvGrpSpPr>
+        <p:cNvPr id="1" name=""/>
+        <p:cNvGrpSpPr/>
+        <p:nvPr/>
+      </p:nvGrpSpPr>
+      <p:grpSpPr>
+        <a:xfrm>
+          <a:off x="0" y="0"/>
+          <a:ext cx="0" cy="0"/>
+          <a:chOff x="0" y="0"/>
+          <a:chExt cx="0" cy="0"/>
+        </a:xfrm>
+      </p:grpSpPr>
+      <p:sp>
+        <p:nvSpPr>
+          <p:cNvPr id="2" name="Title 1"/>
+          <p:cNvSpPr>
+            <a:spLocks noGrp="1"/>
+          </p:cNvSpPr>
+          <p:nvPr>
+            <p:ph type="title"/>
+          </p:nvPr>
+        </p:nvSpPr>
+        <p:spPr/>
+        <p:txBody>
+          <a:bodyPr/>
+          <a:lstStyle/>
+          <a:p>
+            <a:r>
+              <a:rPr lang="en-US" dirty="0"/>
+              <a:t>PTES Methodology</a:t>
+            </a:r>
+          </a:p>
+        </p:txBody>
+      </p:sp>
+      <p:sp>
+        <p:nvSpPr>
+          <p:cNvPr id="3" name="Content Placeholder 2"/>
+          <p:cNvSpPr>
+            <a:spLocks noGrp="1"/>
+          </p:cNvSpPr>
+          <p:nvPr>
+            <p:ph idx="1"/>
+          </p:nvPr>
+        </p:nvSpPr>
+        <p:spPr/>
+        <p:txBody>
+          <a:bodyPr/>
+          <a:lstStyle/>
+          <a:p>
+            <a:r>
+              <a:rPr lang="en-US" dirty="0"/>
+              <a:t>You can use PTES or another methodology to perform a penetration test.  </a:t>
+            </a:r>
+          </a:p>
+          <a:p>
+            <a:r>
+              <a:rPr lang="en-US" dirty="0"/>
+              <a:t>More important to have a standard, repeatable process that you follow. </a:t>
+            </a:r>
+          </a:p>
+          <a:p>
+            <a:r>
+              <a:rPr lang="en-US" dirty="0"/>
+              <a:t>OCD wins </a:t>
+            </a:r>
+            <a:r>
+              <a:rPr lang="en-US"/>
+              <a:t>the prize!</a:t>
+            </a:r>
+            <a:endParaRPr lang="en-US" dirty="0"/>
+          </a:p>
+        </p:txBody>
+      </p:sp>
+    </p:spTree>
+    <p:extLst>
+      <p:ext uri="{BB962C8B-B14F-4D97-AF65-F5344CB8AC3E}">
+        <p14:creationId xmlns:p14="http://schemas.microsoft.com/office/powerpoint/2010/main" val="3238451484"/>
+      </p:ext>
+    </p:extLst>
+  </p:cSld>
+  <p:clrMapOvr>
+    <a:masterClrMapping/>
+  </p:clrMapOvr>
+  <p:transition spd="med"/>
+</p:sld>
+</file>
+
+<file path=ppt/slides/slide16.xml><?xml version="1.0" encoding="utf-8"?>
+<p:sld xmlns:a="http://schemas.openxmlformats.org/drawingml/2006/main" xmlns:r="http://schemas.openxmlformats.org/officeDocument/2006/relationships" xmlns:p="http://schemas.openxmlformats.org/presentationml/2006/main">
+  <p:cSld>
+    <p:spTree>
+      <p:nvGrpSpPr>
+        <p:cNvPr id="1" name=""/>
+        <p:cNvGrpSpPr/>
+        <p:nvPr/>
+      </p:nvGrpSpPr>
+      <p:grpSpPr>
+        <a:xfrm>
+          <a:off x="0" y="0"/>
+          <a:ext cx="0" cy="0"/>
+          <a:chOff x="0" y="0"/>
+          <a:chExt cx="0" cy="0"/>
+        </a:xfrm>
+      </p:grpSpPr>
+      <p:sp>
+        <p:nvSpPr>
+          <p:cNvPr id="2" name="Title 1">
+            <a:extLst>
+              <a:ext uri="{FF2B5EF4-FFF2-40B4-BE49-F238E27FC236}">
+                <a16:creationId xmlns:a16="http://schemas.microsoft.com/office/drawing/2014/main" id="{8878DCD3-066D-4890-8015-DA974C54E5F2}"/>
+              </a:ext>
+            </a:extLst>
+          </p:cNvPr>
+          <p:cNvSpPr>
+            <a:spLocks noGrp="1"/>
+          </p:cNvSpPr>
+          <p:nvPr>
+            <p:ph type="title"/>
+          </p:nvPr>
+        </p:nvSpPr>
+        <p:spPr/>
+        <p:txBody>
+          <a:bodyPr/>
+          <a:lstStyle/>
+          <a:p>
+            <a:endParaRPr lang="en-US"/>
+          </a:p>
+        </p:txBody>
+      </p:sp>
+      <p:sp>
+        <p:nvSpPr>
+          <p:cNvPr id="3" name="Content Placeholder 2">
+            <a:extLst>
+              <a:ext uri="{FF2B5EF4-FFF2-40B4-BE49-F238E27FC236}">
+                <a16:creationId xmlns:a16="http://schemas.microsoft.com/office/drawing/2014/main" id="{6871552C-DB6A-416A-B907-C7C130C755F5}"/>
+              </a:ext>
+            </a:extLst>
+          </p:cNvPr>
+          <p:cNvSpPr>
+            <a:spLocks noGrp="1"/>
+          </p:cNvSpPr>
+          <p:nvPr>
+            <p:ph idx="1"/>
+          </p:nvPr>
+        </p:nvSpPr>
+        <p:spPr/>
+        <p:txBody>
+          <a:bodyPr/>
+          <a:lstStyle/>
+          <a:p>
+            <a:endParaRPr lang="en-US"/>
+          </a:p>
+        </p:txBody>
+      </p:sp>
+      <p:sp>
+        <p:nvSpPr>
+          <p:cNvPr id="4" name="Slide Number Placeholder 3">
+            <a:extLst>
+              <a:ext uri="{FF2B5EF4-FFF2-40B4-BE49-F238E27FC236}">
+                <a16:creationId xmlns:a16="http://schemas.microsoft.com/office/drawing/2014/main" id="{AFC54A25-7F85-4E13-A9F8-09E5C69A3E38}"/>
+              </a:ext>
+            </a:extLst>
+          </p:cNvPr>
+          <p:cNvSpPr>
+            <a:spLocks noGrp="1"/>
+          </p:cNvSpPr>
+          <p:nvPr>
+            <p:ph type="sldNum" sz="quarter" idx="12"/>
+          </p:nvPr>
+        </p:nvSpPr>
+        <p:spPr/>
+        <p:txBody>
+          <a:bodyPr/>
+          <a:lstStyle/>
+          <a:p>
+            <a:pPr>
+              <a:defRPr/>
+            </a:pPr>
+            <a:fld id="{62EB0AC8-263E-4BC2-8316-EF38483797F6}" type="slidenum">
+              <a:rPr lang="en-US" smtClean="0"/>
+              <a:pPr>
+                <a:defRPr/>
+              </a:pPr>
+              <a:t>16</a:t>
+            </a:fld>
+            <a:endParaRPr lang="en-US"/>
+          </a:p>
+        </p:txBody>
+      </p:sp>
+      <p:sp>
+        <p:nvSpPr>
+          <p:cNvPr id="5" name="Date Placeholder 4">
+            <a:extLst>
+              <a:ext uri="{FF2B5EF4-FFF2-40B4-BE49-F238E27FC236}">
+                <a16:creationId xmlns:a16="http://schemas.microsoft.com/office/drawing/2014/main" id="{D6FA68B7-91AB-43A1-A55A-B3BAA85B95D8}"/>
+              </a:ext>
+            </a:extLst>
+          </p:cNvPr>
+          <p:cNvSpPr>
+            <a:spLocks noGrp="1"/>
+          </p:cNvSpPr>
+          <p:nvPr>
+            <p:ph type="dt" sz="half" idx="10"/>
+          </p:nvPr>
+        </p:nvSpPr>
+        <p:spPr/>
+        <p:txBody>
+          <a:bodyPr/>
+          <a:lstStyle/>
+          <a:p>
+            <a:pPr>
+              <a:defRPr/>
+            </a:pPr>
+            <a:r>
+              <a:rPr lang="en-US"/>
+              <a:t>Automated Test Generation</a:t>
+            </a:r>
+            <a:endParaRPr lang="en-US" dirty="0"/>
+          </a:p>
+        </p:txBody>
+      </p:sp>
+      <p:sp>
+        <p:nvSpPr>
+          <p:cNvPr id="6" name="Footer Placeholder 5">
+            <a:extLst>
+              <a:ext uri="{FF2B5EF4-FFF2-40B4-BE49-F238E27FC236}">
+                <a16:creationId xmlns:a16="http://schemas.microsoft.com/office/drawing/2014/main" id="{C6818321-2BE7-4551-BF7E-94DBE5DD05FC}"/>
+              </a:ext>
+            </a:extLst>
+          </p:cNvPr>
+          <p:cNvSpPr>
+            <a:spLocks noGrp="1"/>
+          </p:cNvSpPr>
+          <p:nvPr>
+            <p:ph type="ftr" sz="quarter" idx="11"/>
+          </p:nvPr>
+        </p:nvSpPr>
+        <p:spPr/>
+        <p:txBody>
+          <a:bodyPr/>
+          <a:lstStyle/>
+          <a:p>
+            <a:pPr>
+              <a:defRPr/>
+            </a:pPr>
+            <a:r>
+              <a:rPr lang="en-US"/>
+              <a:t>© Zakeri</a:t>
+            </a:r>
+            <a:endParaRPr lang="en-US" dirty="0"/>
+          </a:p>
+        </p:txBody>
+      </p:sp>
+    </p:spTree>
+    <p:extLst>
+      <p:ext uri="{BB962C8B-B14F-4D97-AF65-F5344CB8AC3E}">
+        <p14:creationId xmlns:p14="http://schemas.microsoft.com/office/powerpoint/2010/main" val="535207018"/>
+      </p:ext>
+    </p:extLst>
+  </p:cSld>
+  <p:clrMapOvr>
+    <a:masterClrMapping/>
+  </p:clrMapOvr>
+  <p:transition spd="med"/>
+</p:sld>
+</file>
+
 <file path=ppt/slides/slide2.xml><?xml version="1.0" encoding="utf-8"?>
 <p:sld xmlns:a="http://schemas.openxmlformats.org/drawingml/2006/main" xmlns:r="http://schemas.openxmlformats.org/officeDocument/2006/relationships" xmlns:p="http://schemas.openxmlformats.org/presentationml/2006/main">
   <p:cSld>
@@ -6458,18 +7317,12 @@
       </p:grpSpPr>
       <p:sp>
         <p:nvSpPr>
-          <p:cNvPr id="10242" name="Rectangle 2">
-            <a:extLst>
-              <a:ext uri="{FF2B5EF4-FFF2-40B4-BE49-F238E27FC236}">
-                <a16:creationId xmlns:a16="http://schemas.microsoft.com/office/drawing/2014/main" id="{A2CCDBA6-5A62-4E0E-82AF-1431EB1F4414}"/>
-              </a:ext>
-            </a:extLst>
-          </p:cNvPr>
-          <p:cNvSpPr>
-            <a:spLocks noGrp="1" noChangeArrowheads="1"/>
-          </p:cNvSpPr>
-          <p:nvPr>
-            <p:ph type="title"/>
+          <p:cNvPr id="2" name="Title 1"/>
+          <p:cNvSpPr>
+            <a:spLocks noGrp="1"/>
+          </p:cNvSpPr>
+          <p:nvPr>
+            <p:ph type="ctrTitle"/>
           </p:nvPr>
         </p:nvSpPr>
         <p:spPr/>
@@ -6478,153 +7331,39 @@
           <a:lstStyle/>
           <a:p>
             <a:r>
-              <a:rPr lang="en-US" altLang="en-US" sz="3200" dirty="0"/>
-              <a:t>What is Automated Test Generation</a:t>
-            </a:r>
-          </a:p>
-        </p:txBody>
-      </p:sp>
-      <p:sp>
-        <p:nvSpPr>
-          <p:cNvPr id="10243" name="Rectangle 3">
-            <a:extLst>
-              <a:ext uri="{FF2B5EF4-FFF2-40B4-BE49-F238E27FC236}">
-                <a16:creationId xmlns:a16="http://schemas.microsoft.com/office/drawing/2014/main" id="{E3FBD971-566A-4CA0-9E57-6DF4BF79698E}"/>
-              </a:ext>
-            </a:extLst>
-          </p:cNvPr>
-          <p:cNvSpPr>
-            <a:spLocks noGrp="1" noChangeArrowheads="1"/>
-          </p:cNvSpPr>
-          <p:nvPr>
-            <p:ph type="body" idx="1"/>
-          </p:nvPr>
-        </p:nvSpPr>
-        <p:spPr>
-          <a:xfrm>
-            <a:off x="93663" y="860425"/>
-            <a:ext cx="8956675" cy="5886604"/>
-          </a:xfrm>
-        </p:spPr>
-        <p:txBody>
-          <a:bodyPr/>
+              <a:rPr lang="en-US" dirty="0"/>
+              <a:t>Penetration Testing </a:t>
+            </a:r>
+          </a:p>
+        </p:txBody>
+      </p:sp>
+      <p:sp>
+        <p:nvSpPr>
+          <p:cNvPr id="3" name="Subtitle 2"/>
+          <p:cNvSpPr>
+            <a:spLocks noGrp="1"/>
+          </p:cNvSpPr>
+          <p:nvPr>
+            <p:ph type="subTitle" idx="1"/>
+          </p:nvPr>
+        </p:nvSpPr>
+        <p:spPr/>
+        <p:txBody>
+          <a:bodyPr>
+            <a:normAutofit/>
+          </a:bodyPr>
           <a:lstStyle/>
           <a:p>
-            <a:r>
-              <a:rPr lang="en-US" altLang="en-US" sz="2800" dirty="0"/>
-              <a:t>Automated testing refers to the techniques which generate the test sets automatically.</a:t>
-            </a:r>
-          </a:p>
-          <a:p>
-            <a:pPr algn="just"/>
-            <a:endParaRPr lang="en-US" altLang="en-US" b="1" dirty="0">
-              <a:solidFill>
-                <a:srgbClr val="FF0066"/>
-              </a:solidFill>
-            </a:endParaRPr>
-          </a:p>
-        </p:txBody>
-      </p:sp>
-      <p:sp>
-        <p:nvSpPr>
-          <p:cNvPr id="2" name="Slide Number Placeholder 1">
-            <a:extLst>
-              <a:ext uri="{FF2B5EF4-FFF2-40B4-BE49-F238E27FC236}">
-                <a16:creationId xmlns:a16="http://schemas.microsoft.com/office/drawing/2014/main" id="{E972EF28-9BF2-40BD-9B0E-C07602A82D89}"/>
-              </a:ext>
-            </a:extLst>
-          </p:cNvPr>
-          <p:cNvSpPr>
-            <a:spLocks noGrp="1"/>
-          </p:cNvSpPr>
-          <p:nvPr>
-            <p:ph type="sldNum" sz="quarter" idx="12"/>
-          </p:nvPr>
-        </p:nvSpPr>
-        <p:spPr/>
-        <p:txBody>
-          <a:bodyPr/>
-          <a:lstStyle/>
-          <a:p>
-            <a:pPr>
-              <a:defRPr/>
-            </a:pPr>
-            <a:fld id="{62EB0AC8-263E-4BC2-8316-EF38483797F6}" type="slidenum">
-              <a:rPr lang="en-US" smtClean="0"/>
-              <a:pPr>
-                <a:defRPr/>
-              </a:pPr>
-              <a:t>2</a:t>
-            </a:fld>
-            <a:endParaRPr lang="en-US"/>
-          </a:p>
-        </p:txBody>
-      </p:sp>
-      <p:sp>
-        <p:nvSpPr>
-          <p:cNvPr id="3" name="Date Placeholder 2">
-            <a:extLst>
-              <a:ext uri="{FF2B5EF4-FFF2-40B4-BE49-F238E27FC236}">
-                <a16:creationId xmlns:a16="http://schemas.microsoft.com/office/drawing/2014/main" id="{2405C90F-B039-4B4D-A55B-7B4E5DE1490F}"/>
-              </a:ext>
-            </a:extLst>
-          </p:cNvPr>
-          <p:cNvSpPr>
-            <a:spLocks noGrp="1"/>
-          </p:cNvSpPr>
-          <p:nvPr>
-            <p:ph type="dt" sz="half" idx="10"/>
-          </p:nvPr>
-        </p:nvSpPr>
-        <p:spPr/>
-        <p:txBody>
-          <a:bodyPr/>
-          <a:lstStyle/>
-          <a:p>
-            <a:pPr>
-              <a:defRPr/>
-            </a:pPr>
-            <a:r>
-              <a:rPr lang="en-US"/>
-              <a:t>Automated Test Generation</a:t>
-            </a:r>
-            <a:endParaRPr lang="en-US" dirty="0"/>
-          </a:p>
-        </p:txBody>
-      </p:sp>
-      <p:sp>
-        <p:nvSpPr>
-          <p:cNvPr id="4" name="Footer Placeholder 3">
-            <a:extLst>
-              <a:ext uri="{FF2B5EF4-FFF2-40B4-BE49-F238E27FC236}">
-                <a16:creationId xmlns:a16="http://schemas.microsoft.com/office/drawing/2014/main" id="{20AB1869-F170-4975-96E5-E7CBB5BF9B55}"/>
-              </a:ext>
-            </a:extLst>
-          </p:cNvPr>
-          <p:cNvSpPr>
-            <a:spLocks noGrp="1"/>
-          </p:cNvSpPr>
-          <p:nvPr>
-            <p:ph type="ftr" sz="quarter" idx="11"/>
-          </p:nvPr>
-        </p:nvSpPr>
-        <p:spPr/>
-        <p:txBody>
-          <a:bodyPr/>
-          <a:lstStyle/>
-          <a:p>
-            <a:pPr>
-              <a:defRPr/>
-            </a:pPr>
-            <a:r>
-              <a:rPr lang="en-US"/>
-              <a:t>© Zakeri</a:t>
-            </a:r>
-            <a:endParaRPr lang="en-US" dirty="0"/>
+            <a:endParaRPr lang="en-US" sz="1050" dirty="0"/>
           </a:p>
         </p:txBody>
       </p:sp>
     </p:spTree>
+    <p:extLst>
+      <p:ext uri="{BB962C8B-B14F-4D97-AF65-F5344CB8AC3E}">
+        <p14:creationId xmlns:p14="http://schemas.microsoft.com/office/powerpoint/2010/main" val="2780164684"/>
+      </p:ext>
+    </p:extLst>
   </p:cSld>
   <p:clrMapOvr>
     <a:masterClrMapping/>
@@ -6652,72 +7391,147 @@
       </p:grpSpPr>
       <p:sp>
         <p:nvSpPr>
-          <p:cNvPr id="2" name="Title 1">
-            <a:extLst>
-              <a:ext uri="{FF2B5EF4-FFF2-40B4-BE49-F238E27FC236}">
-                <a16:creationId xmlns:a16="http://schemas.microsoft.com/office/drawing/2014/main" id="{56D46468-24ED-E539-0D9E-2A5AFFC49936}"/>
-              </a:ext>
-            </a:extLst>
-          </p:cNvPr>
-          <p:cNvSpPr>
-            <a:spLocks noGrp="1"/>
-          </p:cNvSpPr>
-          <p:nvPr>
-            <p:ph type="ctrTitle"/>
-          </p:nvPr>
-        </p:nvSpPr>
-        <p:spPr>
-          <a:xfrm>
-            <a:off x="452761" y="1917774"/>
-            <a:ext cx="8273989" cy="2388412"/>
-          </a:xfrm>
-        </p:spPr>
-        <p:txBody>
-          <a:bodyPr/>
+          <p:cNvPr id="2" name="Title 1"/>
+          <p:cNvSpPr>
+            <a:spLocks noGrp="1"/>
+          </p:cNvSpPr>
+          <p:nvPr>
+            <p:ph type="title"/>
+          </p:nvPr>
+        </p:nvSpPr>
+        <p:spPr/>
+        <p:txBody>
+          <a:bodyPr>
+            <a:noAutofit/>
+          </a:bodyPr>
           <a:lstStyle/>
           <a:p>
-            <a:pPr algn="ctr"/>
-            <a:r>
-              <a:rPr lang="en-US" sz="6000" dirty="0">
-                <a:latin typeface="+mj-lt"/>
+            <a:r>
+              <a:rPr lang="en-US" sz="2400" dirty="0"/>
+              <a:t>Penetration Testing Execution Standard (PTES)</a:t>
+            </a:r>
+          </a:p>
+        </p:txBody>
+      </p:sp>
+      <p:sp>
+        <p:nvSpPr>
+          <p:cNvPr id="3" name="Content Placeholder 2"/>
+          <p:cNvSpPr>
+            <a:spLocks noGrp="1"/>
+          </p:cNvSpPr>
+          <p:nvPr>
+            <p:ph idx="1"/>
+          </p:nvPr>
+        </p:nvSpPr>
+        <p:spPr/>
+        <p:txBody>
+          <a:bodyPr>
+            <a:normAutofit fontScale="85000" lnSpcReduction="20000"/>
+          </a:bodyPr>
+          <a:lstStyle/>
+          <a:p>
+            <a:r>
+              <a:rPr lang="en-US" sz="3825" dirty="0"/>
+              <a:t>“Penetration Testing is a way to simulate the methods that an attacker might use to circumvent security controls and gain access to a system.”</a:t>
+            </a:r>
+            <a:r>
+              <a:rPr lang="en-US" sz="3825" baseline="30000" dirty="0"/>
+              <a:t>1  </a:t>
+            </a:r>
+          </a:p>
+          <a:p>
+            <a:endParaRPr lang="en-US" sz="3825" baseline="30000" dirty="0"/>
+          </a:p>
+          <a:p>
+            <a:pPr marL="0" indent="0">
+              <a:buNone/>
+            </a:pPr>
+            <a:r>
+              <a:rPr lang="en-US" sz="3825" baseline="30000" dirty="0"/>
+              <a:t> </a:t>
+            </a:r>
+            <a:r>
+              <a:rPr lang="en-US" sz="3825" dirty="0"/>
+              <a:t>   PTES, baseline fundamentals for performing a penetration test – </a:t>
+            </a:r>
+          </a:p>
+          <a:p>
+            <a:pPr marL="0" indent="0">
+              <a:buNone/>
+            </a:pPr>
+            <a:endParaRPr lang="en-US" sz="1500" dirty="0"/>
+          </a:p>
+          <a:p>
+            <a:pPr marL="0" indent="0" algn="ctr">
+              <a:buNone/>
+            </a:pPr>
+            <a:r>
+              <a:rPr lang="en-US" sz="3750" dirty="0">
+                <a:solidFill>
+                  <a:srgbClr val="FF0000"/>
+                </a:solidFill>
+                <a:hlinkClick r:id="rId2">
+                  <a:extLst>
+                    <a:ext uri="{A12FA001-AC4F-418D-AE19-62706E023703}">
+                      <ahyp:hlinkClr xmlns:ahyp="http://schemas.microsoft.com/office/drawing/2018/hyperlinkcolor" val="tx"/>
+                    </a:ext>
+                  </a:extLst>
+                </a:hlinkClick>
               </a:rPr>
-              <a:t>Search-based software testing (SBST)</a:t>
-            </a:r>
-          </a:p>
-        </p:txBody>
-      </p:sp>
-      <p:sp>
-        <p:nvSpPr>
-          <p:cNvPr id="3" name="Subtitle 2">
-            <a:extLst>
-              <a:ext uri="{FF2B5EF4-FFF2-40B4-BE49-F238E27FC236}">
-                <a16:creationId xmlns:a16="http://schemas.microsoft.com/office/drawing/2014/main" id="{36B224FA-41F2-A36A-6DF3-977FCE941FAF}"/>
-              </a:ext>
-            </a:extLst>
-          </p:cNvPr>
-          <p:cNvSpPr>
-            <a:spLocks noGrp="1"/>
-          </p:cNvSpPr>
-          <p:nvPr>
-            <p:ph type="subTitle" idx="1"/>
-          </p:nvPr>
-        </p:nvSpPr>
-        <p:spPr/>
-        <p:txBody>
-          <a:bodyPr/>
-          <a:lstStyle/>
-          <a:p>
+              <a:t>http://www.pentest-standard.org/</a:t>
+            </a:r>
+            <a:endParaRPr lang="en-US" dirty="0">
+              <a:solidFill>
+                <a:srgbClr val="FF0000"/>
+              </a:solidFill>
+            </a:endParaRPr>
+          </a:p>
+          <a:p>
+            <a:endParaRPr lang="en-US" dirty="0"/>
+          </a:p>
+          <a:p>
+            <a:endParaRPr lang="en-US" dirty="0"/>
+          </a:p>
+          <a:p>
+            <a:endParaRPr lang="en-US" dirty="0"/>
+          </a:p>
+          <a:p>
+            <a:endParaRPr lang="en-US" dirty="0"/>
+          </a:p>
+          <a:p>
+            <a:endParaRPr lang="en-US" sz="750" dirty="0"/>
+          </a:p>
+          <a:p>
+            <a:r>
+              <a:rPr lang="en-US" baseline="30000" dirty="0"/>
+              <a:t>1</a:t>
+            </a:r>
             <a:r>
               <a:rPr lang="en-US" dirty="0"/>
-              <a:t>  </a:t>
-            </a:r>
+              <a:t>Kennedy, David, et. al. </a:t>
+            </a:r>
+            <a:r>
+              <a:rPr lang="en-US" i="1" dirty="0" err="1"/>
+              <a:t>Metasploit</a:t>
+            </a:r>
+            <a:r>
+              <a:rPr lang="en-US" i="1" dirty="0"/>
+              <a:t>: The Penetration Tester’s Guide</a:t>
+            </a:r>
+            <a:r>
+              <a:rPr lang="en-US" dirty="0"/>
+              <a:t>. San Francisco: No Starch Press. 2011. Print. </a:t>
+            </a:r>
+          </a:p>
+          <a:p>
+            <a:endParaRPr lang="en-US" dirty="0"/>
           </a:p>
         </p:txBody>
       </p:sp>
     </p:spTree>
     <p:extLst>
       <p:ext uri="{BB962C8B-B14F-4D97-AF65-F5344CB8AC3E}">
-        <p14:creationId xmlns:p14="http://schemas.microsoft.com/office/powerpoint/2010/main" val="3164316605"/>
+        <p14:creationId xmlns:p14="http://schemas.microsoft.com/office/powerpoint/2010/main" val="1003579681"/>
       </p:ext>
     </p:extLst>
   </p:cSld>
@@ -6747,13 +7561,7 @@
       </p:grpSpPr>
       <p:sp>
         <p:nvSpPr>
-          <p:cNvPr id="2" name="Title 1">
-            <a:extLst>
-              <a:ext uri="{FF2B5EF4-FFF2-40B4-BE49-F238E27FC236}">
-                <a16:creationId xmlns:a16="http://schemas.microsoft.com/office/drawing/2014/main" id="{8878DCD3-066D-4890-8015-DA974C54E5F2}"/>
-              </a:ext>
-            </a:extLst>
-          </p:cNvPr>
+          <p:cNvPr id="2" name="Title 1"/>
           <p:cNvSpPr>
             <a:spLocks noGrp="1"/>
           </p:cNvSpPr>
@@ -6766,19 +7574,16 @@
           <a:bodyPr/>
           <a:lstStyle/>
           <a:p>
-            <a:endParaRPr lang="en-US"/>
-          </a:p>
-        </p:txBody>
-      </p:sp>
-      <p:sp>
-        <p:nvSpPr>
-          <p:cNvPr id="3" name="Content Placeholder 2">
-            <a:extLst>
-              <a:ext uri="{FF2B5EF4-FFF2-40B4-BE49-F238E27FC236}">
-                <a16:creationId xmlns:a16="http://schemas.microsoft.com/office/drawing/2014/main" id="{6871552C-DB6A-416A-B907-C7C130C755F5}"/>
-              </a:ext>
-            </a:extLst>
-          </p:cNvPr>
+            <a:r>
+              <a:rPr lang="en-US" dirty="0"/>
+              <a:t>PTES Phases</a:t>
+            </a:r>
+          </a:p>
+        </p:txBody>
+      </p:sp>
+      <p:sp>
+        <p:nvSpPr>
+          <p:cNvPr id="3" name="Content Placeholder 2"/>
           <p:cNvSpPr>
             <a:spLocks noGrp="1"/>
           </p:cNvSpPr>
@@ -6791,113 +7596,600 @@
           <a:bodyPr/>
           <a:lstStyle/>
           <a:p>
-            <a:endParaRPr lang="en-US"/>
-          </a:p>
-        </p:txBody>
-      </p:sp>
-      <p:sp>
-        <p:nvSpPr>
-          <p:cNvPr id="4" name="Slide Number Placeholder 3">
-            <a:extLst>
-              <a:ext uri="{FF2B5EF4-FFF2-40B4-BE49-F238E27FC236}">
-                <a16:creationId xmlns:a16="http://schemas.microsoft.com/office/drawing/2014/main" id="{AFC54A25-7F85-4E13-A9F8-09E5C69A3E38}"/>
-              </a:ext>
-            </a:extLst>
-          </p:cNvPr>
-          <p:cNvSpPr>
-            <a:spLocks noGrp="1"/>
-          </p:cNvSpPr>
-          <p:nvPr>
-            <p:ph type="sldNum" sz="quarter" idx="12"/>
-          </p:nvPr>
-        </p:nvSpPr>
-        <p:spPr/>
-        <p:txBody>
-          <a:bodyPr/>
-          <a:lstStyle/>
-          <a:p>
-            <a:pPr>
-              <a:defRPr/>
+            <a:pPr marL="342900" indent="-342900">
+              <a:buFont typeface="+mj-lt"/>
+              <a:buAutoNum type="arabicPeriod"/>
             </a:pPr>
-            <a:fld id="{62EB0AC8-263E-4BC2-8316-EF38483797F6}" type="slidenum">
-              <a:rPr lang="en-US" smtClean="0"/>
-              <a:pPr>
-                <a:defRPr/>
-              </a:pPr>
-              <a:t>4</a:t>
-            </a:fld>
-            <a:endParaRPr lang="en-US"/>
-          </a:p>
-        </p:txBody>
-      </p:sp>
-      <p:sp>
-        <p:nvSpPr>
-          <p:cNvPr id="5" name="Date Placeholder 4">
-            <a:extLst>
-              <a:ext uri="{FF2B5EF4-FFF2-40B4-BE49-F238E27FC236}">
-                <a16:creationId xmlns:a16="http://schemas.microsoft.com/office/drawing/2014/main" id="{D6FA68B7-91AB-43A1-A55A-B3BAA85B95D8}"/>
-              </a:ext>
-            </a:extLst>
-          </p:cNvPr>
-          <p:cNvSpPr>
-            <a:spLocks noGrp="1"/>
-          </p:cNvSpPr>
-          <p:nvPr>
-            <p:ph type="dt" sz="half" idx="10"/>
-          </p:nvPr>
-        </p:nvSpPr>
-        <p:spPr/>
-        <p:txBody>
-          <a:bodyPr/>
-          <a:lstStyle/>
-          <a:p>
-            <a:pPr>
-              <a:defRPr/>
+            <a:r>
+              <a:rPr lang="en-US" dirty="0"/>
+              <a:t>Pre-Engagement</a:t>
+            </a:r>
+          </a:p>
+          <a:p>
+            <a:pPr marL="342900" indent="-342900">
+              <a:buFont typeface="+mj-lt"/>
+              <a:buAutoNum type="arabicPeriod"/>
             </a:pPr>
             <a:r>
-              <a:rPr lang="en-US"/>
-              <a:t>Automated Test Generation</a:t>
-            </a:r>
-            <a:endParaRPr lang="en-US" dirty="0"/>
-          </a:p>
-        </p:txBody>
-      </p:sp>
-      <p:sp>
-        <p:nvSpPr>
-          <p:cNvPr id="6" name="Footer Placeholder 5">
-            <a:extLst>
-              <a:ext uri="{FF2B5EF4-FFF2-40B4-BE49-F238E27FC236}">
-                <a16:creationId xmlns:a16="http://schemas.microsoft.com/office/drawing/2014/main" id="{C6818321-2BE7-4551-BF7E-94DBE5DD05FC}"/>
-              </a:ext>
-            </a:extLst>
-          </p:cNvPr>
-          <p:cNvSpPr>
-            <a:spLocks noGrp="1"/>
-          </p:cNvSpPr>
-          <p:nvPr>
-            <p:ph type="ftr" sz="quarter" idx="11"/>
-          </p:nvPr>
-        </p:nvSpPr>
-        <p:spPr/>
-        <p:txBody>
-          <a:bodyPr/>
-          <a:lstStyle/>
-          <a:p>
-            <a:pPr>
-              <a:defRPr/>
+              <a:rPr lang="en-US" dirty="0"/>
+              <a:t>Intelligence Gathering</a:t>
+            </a:r>
+          </a:p>
+          <a:p>
+            <a:pPr marL="342900" indent="-342900">
+              <a:buFont typeface="+mj-lt"/>
+              <a:buAutoNum type="arabicPeriod"/>
             </a:pPr>
             <a:r>
-              <a:rPr lang="en-US"/>
-              <a:t>© Zakeri</a:t>
-            </a:r>
-            <a:endParaRPr lang="en-US" dirty="0"/>
+              <a:rPr lang="en-US" dirty="0"/>
+              <a:t>Threat Modeling</a:t>
+            </a:r>
+          </a:p>
+          <a:p>
+            <a:pPr marL="342900" indent="-342900">
+              <a:buFont typeface="+mj-lt"/>
+              <a:buAutoNum type="arabicPeriod"/>
+            </a:pPr>
+            <a:r>
+              <a:rPr lang="en-US" dirty="0"/>
+              <a:t>Vulnerability Analysis</a:t>
+            </a:r>
+          </a:p>
+          <a:p>
+            <a:pPr marL="342900" indent="-342900">
+              <a:buFont typeface="+mj-lt"/>
+              <a:buAutoNum type="arabicPeriod"/>
+            </a:pPr>
+            <a:r>
+              <a:rPr lang="en-US" dirty="0"/>
+              <a:t>Exploitation</a:t>
+            </a:r>
+          </a:p>
+          <a:p>
+            <a:pPr marL="342900" indent="-342900">
+              <a:buFont typeface="+mj-lt"/>
+              <a:buAutoNum type="arabicPeriod"/>
+            </a:pPr>
+            <a:r>
+              <a:rPr lang="en-US" dirty="0"/>
+              <a:t>Post Exploitation</a:t>
+            </a:r>
+          </a:p>
+          <a:p>
+            <a:pPr marL="342900" indent="-342900">
+              <a:buFont typeface="+mj-lt"/>
+              <a:buAutoNum type="arabicPeriod"/>
+            </a:pPr>
+            <a:r>
+              <a:rPr lang="en-US" dirty="0"/>
+              <a:t>Reporting</a:t>
+            </a:r>
           </a:p>
         </p:txBody>
       </p:sp>
     </p:spTree>
     <p:extLst>
       <p:ext uri="{BB962C8B-B14F-4D97-AF65-F5344CB8AC3E}">
-        <p14:creationId xmlns:p14="http://schemas.microsoft.com/office/powerpoint/2010/main" val="535207018"/>
+        <p14:creationId xmlns:p14="http://schemas.microsoft.com/office/powerpoint/2010/main" val="2448045810"/>
+      </p:ext>
+    </p:extLst>
+  </p:cSld>
+  <p:clrMapOvr>
+    <a:masterClrMapping/>
+  </p:clrMapOvr>
+  <p:transition spd="med"/>
+</p:sld>
+</file>
+
+<file path=ppt/slides/slide5.xml><?xml version="1.0" encoding="utf-8"?>
+<p:sld xmlns:a="http://schemas.openxmlformats.org/drawingml/2006/main" xmlns:r="http://schemas.openxmlformats.org/officeDocument/2006/relationships" xmlns:p="http://schemas.openxmlformats.org/presentationml/2006/main">
+  <p:cSld>
+    <p:spTree>
+      <p:nvGrpSpPr>
+        <p:cNvPr id="1" name=""/>
+        <p:cNvGrpSpPr/>
+        <p:nvPr/>
+      </p:nvGrpSpPr>
+      <p:grpSpPr>
+        <a:xfrm>
+          <a:off x="0" y="0"/>
+          <a:ext cx="0" cy="0"/>
+          <a:chOff x="0" y="0"/>
+          <a:chExt cx="0" cy="0"/>
+        </a:xfrm>
+      </p:grpSpPr>
+      <p:sp>
+        <p:nvSpPr>
+          <p:cNvPr id="2" name="Title 1"/>
+          <p:cNvSpPr>
+            <a:spLocks noGrp="1"/>
+          </p:cNvSpPr>
+          <p:nvPr>
+            <p:ph type="title"/>
+          </p:nvPr>
+        </p:nvSpPr>
+        <p:spPr/>
+        <p:txBody>
+          <a:bodyPr/>
+          <a:lstStyle/>
+          <a:p>
+            <a:r>
+              <a:rPr lang="en-US" dirty="0"/>
+              <a:t>Pre-Engagement</a:t>
+            </a:r>
+          </a:p>
+        </p:txBody>
+      </p:sp>
+      <p:sp>
+        <p:nvSpPr>
+          <p:cNvPr id="3" name="Content Placeholder 2"/>
+          <p:cNvSpPr>
+            <a:spLocks noGrp="1"/>
+          </p:cNvSpPr>
+          <p:nvPr>
+            <p:ph idx="1"/>
+          </p:nvPr>
+        </p:nvSpPr>
+        <p:spPr/>
+        <p:txBody>
+          <a:bodyPr/>
+          <a:lstStyle/>
+          <a:p>
+            <a:r>
+              <a:rPr lang="en-US" dirty="0"/>
+              <a:t>Discussing the scope and terms of the penetration test with your client</a:t>
+            </a:r>
+          </a:p>
+          <a:p>
+            <a:pPr lvl="1"/>
+            <a:r>
+              <a:rPr lang="en-US" dirty="0"/>
+              <a:t>Convey the goals of the penetration test</a:t>
+            </a:r>
+          </a:p>
+          <a:p>
+            <a:pPr lvl="1"/>
+            <a:r>
+              <a:rPr lang="en-US" dirty="0"/>
+              <a:t>-use this opportunity to discuss what will happen, the expectations of a full scale penetration test</a:t>
+            </a:r>
+          </a:p>
+          <a:p>
+            <a:pPr lvl="1"/>
+            <a:r>
+              <a:rPr lang="en-US" dirty="0"/>
+              <a:t>- what will be tested – the need for total access to get a complete report</a:t>
+            </a:r>
+          </a:p>
+        </p:txBody>
+      </p:sp>
+    </p:spTree>
+    <p:extLst>
+      <p:ext uri="{BB962C8B-B14F-4D97-AF65-F5344CB8AC3E}">
+        <p14:creationId xmlns:p14="http://schemas.microsoft.com/office/powerpoint/2010/main" val="8322543"/>
+      </p:ext>
+    </p:extLst>
+  </p:cSld>
+  <p:clrMapOvr>
+    <a:masterClrMapping/>
+  </p:clrMapOvr>
+  <p:transition spd="med"/>
+</p:sld>
+</file>
+
+<file path=ppt/slides/slide6.xml><?xml version="1.0" encoding="utf-8"?>
+<p:sld xmlns:a="http://schemas.openxmlformats.org/drawingml/2006/main" xmlns:r="http://schemas.openxmlformats.org/officeDocument/2006/relationships" xmlns:p="http://schemas.openxmlformats.org/presentationml/2006/main">
+  <p:cSld>
+    <p:spTree>
+      <p:nvGrpSpPr>
+        <p:cNvPr id="1" name=""/>
+        <p:cNvGrpSpPr/>
+        <p:nvPr/>
+      </p:nvGrpSpPr>
+      <p:grpSpPr>
+        <a:xfrm>
+          <a:off x="0" y="0"/>
+          <a:ext cx="0" cy="0"/>
+          <a:chOff x="0" y="0"/>
+          <a:chExt cx="0" cy="0"/>
+        </a:xfrm>
+      </p:grpSpPr>
+      <p:sp>
+        <p:nvSpPr>
+          <p:cNvPr id="2" name="Title 1"/>
+          <p:cNvSpPr>
+            <a:spLocks noGrp="1"/>
+          </p:cNvSpPr>
+          <p:nvPr>
+            <p:ph type="title"/>
+          </p:nvPr>
+        </p:nvSpPr>
+        <p:spPr/>
+        <p:txBody>
+          <a:bodyPr/>
+          <a:lstStyle/>
+          <a:p>
+            <a:r>
+              <a:rPr lang="en-US" dirty="0"/>
+              <a:t>Intelligence Gathering</a:t>
+            </a:r>
+          </a:p>
+        </p:txBody>
+      </p:sp>
+      <p:sp>
+        <p:nvSpPr>
+          <p:cNvPr id="3" name="Content Placeholder 2"/>
+          <p:cNvSpPr>
+            <a:spLocks noGrp="1"/>
+          </p:cNvSpPr>
+          <p:nvPr>
+            <p:ph idx="1"/>
+          </p:nvPr>
+        </p:nvSpPr>
+        <p:spPr/>
+        <p:txBody>
+          <a:bodyPr/>
+          <a:lstStyle/>
+          <a:p>
+            <a:r>
+              <a:rPr lang="en-US" dirty="0"/>
+              <a:t>- Gather information about the organization (social media, Google hacking, </a:t>
+            </a:r>
+            <a:r>
+              <a:rPr lang="en-US" dirty="0" err="1"/>
+              <a:t>etc</a:t>
+            </a:r>
+            <a:r>
+              <a:rPr lang="en-US" dirty="0"/>
+              <a:t>)</a:t>
+            </a:r>
+          </a:p>
+          <a:p>
+            <a:r>
+              <a:rPr lang="en-US" dirty="0"/>
+              <a:t>- Start to probe the organization for ports with blocking (use a disposable IP address, </a:t>
+            </a:r>
+          </a:p>
+          <a:p>
+            <a:pPr lvl="1"/>
+            <a:r>
+              <a:rPr lang="en-US" dirty="0"/>
+              <a:t>you will be blocked if this is turned on)</a:t>
+            </a:r>
+          </a:p>
+          <a:p>
+            <a:pPr lvl="1">
+              <a:buFontTx/>
+              <a:buChar char="-"/>
+            </a:pPr>
+            <a:r>
+              <a:rPr lang="en-US" dirty="0"/>
+              <a:t>Test any Web Applications </a:t>
+            </a:r>
+          </a:p>
+          <a:p>
+            <a:pPr lvl="1">
+              <a:buFontTx/>
+              <a:buChar char="-"/>
+            </a:pPr>
+            <a:endParaRPr lang="en-US" dirty="0"/>
+          </a:p>
+          <a:p>
+            <a:pPr marL="3429" lvl="1" indent="0">
+              <a:buNone/>
+            </a:pPr>
+            <a:r>
+              <a:rPr lang="en-US" dirty="0"/>
+              <a:t>Note:  perform scans from an IP address range that cannot be traced back to you or your team. The initial probing can be performed from anywhere (except at your team’s office!).</a:t>
+            </a:r>
+          </a:p>
+          <a:p>
+            <a:endParaRPr lang="en-US" dirty="0"/>
+          </a:p>
+        </p:txBody>
+      </p:sp>
+    </p:spTree>
+    <p:extLst>
+      <p:ext uri="{BB962C8B-B14F-4D97-AF65-F5344CB8AC3E}">
+        <p14:creationId xmlns:p14="http://schemas.microsoft.com/office/powerpoint/2010/main" val="2610695285"/>
+      </p:ext>
+    </p:extLst>
+  </p:cSld>
+  <p:clrMapOvr>
+    <a:masterClrMapping/>
+  </p:clrMapOvr>
+  <p:transition spd="med"/>
+</p:sld>
+</file>
+
+<file path=ppt/slides/slide7.xml><?xml version="1.0" encoding="utf-8"?>
+<p:sld xmlns:a="http://schemas.openxmlformats.org/drawingml/2006/main" xmlns:r="http://schemas.openxmlformats.org/officeDocument/2006/relationships" xmlns:p="http://schemas.openxmlformats.org/presentationml/2006/main">
+  <p:cSld>
+    <p:spTree>
+      <p:nvGrpSpPr>
+        <p:cNvPr id="1" name=""/>
+        <p:cNvGrpSpPr/>
+        <p:nvPr/>
+      </p:nvGrpSpPr>
+      <p:grpSpPr>
+        <a:xfrm>
+          <a:off x="0" y="0"/>
+          <a:ext cx="0" cy="0"/>
+          <a:chOff x="0" y="0"/>
+          <a:chExt cx="0" cy="0"/>
+        </a:xfrm>
+      </p:grpSpPr>
+      <p:sp>
+        <p:nvSpPr>
+          <p:cNvPr id="2" name="Title 1"/>
+          <p:cNvSpPr>
+            <a:spLocks noGrp="1"/>
+          </p:cNvSpPr>
+          <p:nvPr>
+            <p:ph type="title"/>
+          </p:nvPr>
+        </p:nvSpPr>
+        <p:spPr/>
+        <p:txBody>
+          <a:bodyPr/>
+          <a:lstStyle/>
+          <a:p>
+            <a:r>
+              <a:rPr lang="en-US" dirty="0"/>
+              <a:t>Threat Modeling</a:t>
+            </a:r>
+          </a:p>
+        </p:txBody>
+      </p:sp>
+      <p:sp>
+        <p:nvSpPr>
+          <p:cNvPr id="3" name="Content Placeholder 2"/>
+          <p:cNvSpPr>
+            <a:spLocks noGrp="1"/>
+          </p:cNvSpPr>
+          <p:nvPr>
+            <p:ph idx="1"/>
+          </p:nvPr>
+        </p:nvSpPr>
+        <p:spPr/>
+        <p:txBody>
+          <a:bodyPr/>
+          <a:lstStyle/>
+          <a:p>
+            <a:r>
+              <a:rPr lang="en-US" dirty="0"/>
+              <a:t>Using the information acquired in the intelligence gathering.</a:t>
+            </a:r>
+          </a:p>
+          <a:p>
+            <a:r>
+              <a:rPr lang="en-US" dirty="0"/>
+              <a:t>Look at the organization as an adversary and determine </a:t>
+            </a:r>
+          </a:p>
+          <a:p>
+            <a:pPr lvl="1"/>
+            <a:r>
+              <a:rPr lang="en-US" dirty="0"/>
+              <a:t>-where the threats are coming from, </a:t>
+            </a:r>
+          </a:p>
+          <a:p>
+            <a:pPr lvl="1"/>
+            <a:r>
+              <a:rPr lang="en-US" dirty="0"/>
+              <a:t>-what form they may take </a:t>
+            </a:r>
+          </a:p>
+          <a:p>
+            <a:pPr lvl="1"/>
+            <a:r>
+              <a:rPr lang="en-US" dirty="0"/>
+              <a:t>-and what they are after. </a:t>
+            </a:r>
+          </a:p>
+        </p:txBody>
+      </p:sp>
+    </p:spTree>
+    <p:extLst>
+      <p:ext uri="{BB962C8B-B14F-4D97-AF65-F5344CB8AC3E}">
+        <p14:creationId xmlns:p14="http://schemas.microsoft.com/office/powerpoint/2010/main" val="2612559062"/>
+      </p:ext>
+    </p:extLst>
+  </p:cSld>
+  <p:clrMapOvr>
+    <a:masterClrMapping/>
+  </p:clrMapOvr>
+  <p:transition spd="med"/>
+</p:sld>
+</file>
+
+<file path=ppt/slides/slide8.xml><?xml version="1.0" encoding="utf-8"?>
+<p:sld xmlns:a="http://schemas.openxmlformats.org/drawingml/2006/main" xmlns:r="http://schemas.openxmlformats.org/officeDocument/2006/relationships" xmlns:p="http://schemas.openxmlformats.org/presentationml/2006/main">
+  <p:cSld>
+    <p:spTree>
+      <p:nvGrpSpPr>
+        <p:cNvPr id="1" name=""/>
+        <p:cNvGrpSpPr/>
+        <p:nvPr/>
+      </p:nvGrpSpPr>
+      <p:grpSpPr>
+        <a:xfrm>
+          <a:off x="0" y="0"/>
+          <a:ext cx="0" cy="0"/>
+          <a:chOff x="0" y="0"/>
+          <a:chExt cx="0" cy="0"/>
+        </a:xfrm>
+      </p:grpSpPr>
+      <p:sp>
+        <p:nvSpPr>
+          <p:cNvPr id="2" name="Title 1"/>
+          <p:cNvSpPr>
+            <a:spLocks noGrp="1"/>
+          </p:cNvSpPr>
+          <p:nvPr>
+            <p:ph type="title"/>
+          </p:nvPr>
+        </p:nvSpPr>
+        <p:spPr/>
+        <p:txBody>
+          <a:bodyPr/>
+          <a:lstStyle/>
+          <a:p>
+            <a:r>
+              <a:rPr lang="en-US" dirty="0"/>
+              <a:t>Vulnerability Analysis </a:t>
+            </a:r>
+          </a:p>
+        </p:txBody>
+      </p:sp>
+      <p:sp>
+        <p:nvSpPr>
+          <p:cNvPr id="3" name="Content Placeholder 2"/>
+          <p:cNvSpPr>
+            <a:spLocks noGrp="1"/>
+          </p:cNvSpPr>
+          <p:nvPr>
+            <p:ph idx="1"/>
+          </p:nvPr>
+        </p:nvSpPr>
+        <p:spPr/>
+        <p:txBody>
+          <a:bodyPr/>
+          <a:lstStyle/>
+          <a:p>
+            <a:r>
+              <a:rPr lang="en-US" dirty="0"/>
+              <a:t>You will use all the previous information from prior phases </a:t>
+            </a:r>
+          </a:p>
+          <a:p>
+            <a:r>
+              <a:rPr lang="en-US" dirty="0"/>
+              <a:t>This is a detailed analysis taking into account port and vulnerability scans, banner grabbing, and information from intelligence gathering.</a:t>
+            </a:r>
+          </a:p>
+        </p:txBody>
+      </p:sp>
+    </p:spTree>
+    <p:extLst>
+      <p:ext uri="{BB962C8B-B14F-4D97-AF65-F5344CB8AC3E}">
+        <p14:creationId xmlns:p14="http://schemas.microsoft.com/office/powerpoint/2010/main" val="3737051890"/>
+      </p:ext>
+    </p:extLst>
+  </p:cSld>
+  <p:clrMapOvr>
+    <a:masterClrMapping/>
+  </p:clrMapOvr>
+  <p:transition spd="med"/>
+</p:sld>
+</file>
+
+<file path=ppt/slides/slide9.xml><?xml version="1.0" encoding="utf-8"?>
+<p:sld xmlns:a="http://schemas.openxmlformats.org/drawingml/2006/main" xmlns:r="http://schemas.openxmlformats.org/officeDocument/2006/relationships" xmlns:p="http://schemas.openxmlformats.org/presentationml/2006/main">
+  <p:cSld>
+    <p:spTree>
+      <p:nvGrpSpPr>
+        <p:cNvPr id="1" name=""/>
+        <p:cNvGrpSpPr/>
+        <p:nvPr/>
+      </p:nvGrpSpPr>
+      <p:grpSpPr>
+        <a:xfrm>
+          <a:off x="0" y="0"/>
+          <a:ext cx="0" cy="0"/>
+          <a:chOff x="0" y="0"/>
+          <a:chExt cx="0" cy="0"/>
+        </a:xfrm>
+      </p:grpSpPr>
+      <p:sp>
+        <p:nvSpPr>
+          <p:cNvPr id="2" name="Title 1"/>
+          <p:cNvSpPr>
+            <a:spLocks noGrp="1"/>
+          </p:cNvSpPr>
+          <p:nvPr>
+            <p:ph type="title"/>
+          </p:nvPr>
+        </p:nvSpPr>
+        <p:spPr/>
+        <p:txBody>
+          <a:bodyPr/>
+          <a:lstStyle/>
+          <a:p>
+            <a:r>
+              <a:rPr lang="en-US" dirty="0"/>
+              <a:t>Exploitation</a:t>
+            </a:r>
+          </a:p>
+        </p:txBody>
+      </p:sp>
+      <p:sp>
+        <p:nvSpPr>
+          <p:cNvPr id="3" name="Content Placeholder 2"/>
+          <p:cNvSpPr>
+            <a:spLocks noGrp="1"/>
+          </p:cNvSpPr>
+          <p:nvPr>
+            <p:ph idx="1"/>
+          </p:nvPr>
+        </p:nvSpPr>
+        <p:spPr/>
+        <p:txBody>
+          <a:bodyPr/>
+          <a:lstStyle/>
+          <a:p>
+            <a:r>
+              <a:rPr lang="en-US" dirty="0"/>
+              <a:t>The “glam” part of the penetration test</a:t>
+            </a:r>
+          </a:p>
+          <a:p>
+            <a:r>
+              <a:rPr lang="en-US" dirty="0"/>
+              <a:t>Often brute force (not very “glam”) instead of precision</a:t>
+            </a:r>
+          </a:p>
+          <a:p>
+            <a:r>
+              <a:rPr lang="en-US" dirty="0"/>
+              <a:t>Separates the “good” and the “bad” testers – </a:t>
+            </a:r>
+          </a:p>
+          <a:p>
+            <a:pPr lvl="1"/>
+            <a:r>
+              <a:rPr lang="en-US" dirty="0"/>
+              <a:t>“Bad” testers will fire off massive onslaught of exploits</a:t>
+            </a:r>
+          </a:p>
+          <a:p>
+            <a:pPr lvl="1"/>
+            <a:r>
+              <a:rPr lang="en-US" dirty="0"/>
+              <a:t>“Good” testers will perform only exploits expected to succeed based on info gathered</a:t>
+            </a:r>
+          </a:p>
+          <a:p>
+            <a:pPr lvl="1"/>
+            <a:endParaRPr lang="en-US" dirty="0"/>
+          </a:p>
+          <a:p>
+            <a:pPr lvl="1"/>
+            <a:r>
+              <a:rPr lang="en-US" dirty="0"/>
+              <a:t>Creating “noise” with massive exploits and hoping for a result is not the way!</a:t>
+            </a:r>
+          </a:p>
+          <a:p>
+            <a:endParaRPr lang="en-US" dirty="0"/>
+          </a:p>
+        </p:txBody>
+      </p:sp>
+    </p:spTree>
+    <p:extLst>
+      <p:ext uri="{BB962C8B-B14F-4D97-AF65-F5344CB8AC3E}">
+        <p14:creationId xmlns:p14="http://schemas.microsoft.com/office/powerpoint/2010/main" val="1253513618"/>
       </p:ext>
     </p:extLst>
   </p:cSld>

</xml_diff>